<commit_message>
Update presentation and workshop
</commit_message>
<xml_diff>
--- a/Presentation.pptx
+++ b/Presentation.pptx
@@ -23,10 +23,6 @@
     <p:sldId id="275" r:id="rId17"/>
     <p:sldId id="263" r:id="rId18"/>
     <p:sldId id="277" r:id="rId19"/>
-    <p:sldId id="278" r:id="rId20"/>
-    <p:sldId id="257" r:id="rId21"/>
-    <p:sldId id="258" r:id="rId22"/>
-    <p:sldId id="259" r:id="rId23"/>
   </p:sldIdLst>
   <p:sldSz cx="12192000" cy="6858000"/>
   <p:notesSz cx="6858000" cy="9144000"/>
@@ -318,7 +314,7 @@
           <a:p>
             <a:fld id="{ABE9DD24-0BE8-48CF-8EBF-E8D6CE3426BD}" type="datetimeFigureOut">
               <a:rPr lang="en-GB" smtClean="0"/>
-              <a:t>22/06/2021</a:t>
+              <a:t>05/07/2021</a:t>
             </a:fld>
             <a:endParaRPr lang="en-GB"/>
           </a:p>
@@ -616,7 +612,7 @@
           <a:p>
             <a:fld id="{ABE9DD24-0BE8-48CF-8EBF-E8D6CE3426BD}" type="datetimeFigureOut">
               <a:rPr lang="en-GB" smtClean="0"/>
-              <a:t>22/06/2021</a:t>
+              <a:t>05/07/2021</a:t>
             </a:fld>
             <a:endParaRPr lang="en-GB"/>
           </a:p>
@@ -808,7 +804,7 @@
           <a:p>
             <a:fld id="{ABE9DD24-0BE8-48CF-8EBF-E8D6CE3426BD}" type="datetimeFigureOut">
               <a:rPr lang="en-GB" smtClean="0"/>
-              <a:t>22/06/2021</a:t>
+              <a:t>05/07/2021</a:t>
             </a:fld>
             <a:endParaRPr lang="en-GB"/>
           </a:p>
@@ -1069,7 +1065,7 @@
           <a:p>
             <a:fld id="{ABE9DD24-0BE8-48CF-8EBF-E8D6CE3426BD}" type="datetimeFigureOut">
               <a:rPr lang="en-GB" smtClean="0"/>
-              <a:t>22/06/2021</a:t>
+              <a:t>05/07/2021</a:t>
             </a:fld>
             <a:endParaRPr lang="en-GB"/>
           </a:p>
@@ -1493,7 +1489,7 @@
           <a:p>
             <a:fld id="{ABE9DD24-0BE8-48CF-8EBF-E8D6CE3426BD}" type="datetimeFigureOut">
               <a:rPr lang="en-GB" smtClean="0"/>
-              <a:t>22/06/2021</a:t>
+              <a:t>05/07/2021</a:t>
             </a:fld>
             <a:endParaRPr lang="en-GB"/>
           </a:p>
@@ -2030,7 +2026,7 @@
           <a:p>
             <a:fld id="{ABE9DD24-0BE8-48CF-8EBF-E8D6CE3426BD}" type="datetimeFigureOut">
               <a:rPr lang="en-GB" smtClean="0"/>
-              <a:t>22/06/2021</a:t>
+              <a:t>05/07/2021</a:t>
             </a:fld>
             <a:endParaRPr lang="en-GB"/>
           </a:p>
@@ -2894,7 +2890,7 @@
           <a:p>
             <a:fld id="{ABE9DD24-0BE8-48CF-8EBF-E8D6CE3426BD}" type="datetimeFigureOut">
               <a:rPr lang="en-GB" smtClean="0"/>
-              <a:t>22/06/2021</a:t>
+              <a:t>05/07/2021</a:t>
             </a:fld>
             <a:endParaRPr lang="en-GB"/>
           </a:p>
@@ -3064,7 +3060,7 @@
           <a:p>
             <a:fld id="{ABE9DD24-0BE8-48CF-8EBF-E8D6CE3426BD}" type="datetimeFigureOut">
               <a:rPr lang="en-GB" smtClean="0"/>
-              <a:t>22/06/2021</a:t>
+              <a:t>05/07/2021</a:t>
             </a:fld>
             <a:endParaRPr lang="en-GB"/>
           </a:p>
@@ -3248,7 +3244,7 @@
           <a:p>
             <a:fld id="{ABE9DD24-0BE8-48CF-8EBF-E8D6CE3426BD}" type="datetimeFigureOut">
               <a:rPr lang="en-GB" smtClean="0"/>
-              <a:t>22/06/2021</a:t>
+              <a:t>05/07/2021</a:t>
             </a:fld>
             <a:endParaRPr lang="en-GB"/>
           </a:p>
@@ -3418,7 +3414,7 @@
           <a:p>
             <a:fld id="{ABE9DD24-0BE8-48CF-8EBF-E8D6CE3426BD}" type="datetimeFigureOut">
               <a:rPr lang="en-GB" smtClean="0"/>
-              <a:t>22/06/2021</a:t>
+              <a:t>05/07/2021</a:t>
             </a:fld>
             <a:endParaRPr lang="en-GB"/>
           </a:p>
@@ -3662,7 +3658,7 @@
           <a:p>
             <a:fld id="{ABE9DD24-0BE8-48CF-8EBF-E8D6CE3426BD}" type="datetimeFigureOut">
               <a:rPr lang="en-GB" smtClean="0"/>
-              <a:t>22/06/2021</a:t>
+              <a:t>05/07/2021</a:t>
             </a:fld>
             <a:endParaRPr lang="en-GB"/>
           </a:p>
@@ -3898,7 +3894,7 @@
           <a:p>
             <a:fld id="{ABE9DD24-0BE8-48CF-8EBF-E8D6CE3426BD}" type="datetimeFigureOut">
               <a:rPr lang="en-GB" smtClean="0"/>
-              <a:t>22/06/2021</a:t>
+              <a:t>05/07/2021</a:t>
             </a:fld>
             <a:endParaRPr lang="en-GB"/>
           </a:p>
@@ -4364,7 +4360,7 @@
           <a:p>
             <a:fld id="{ABE9DD24-0BE8-48CF-8EBF-E8D6CE3426BD}" type="datetimeFigureOut">
               <a:rPr lang="en-GB" smtClean="0"/>
-              <a:t>22/06/2021</a:t>
+              <a:t>05/07/2021</a:t>
             </a:fld>
             <a:endParaRPr lang="en-GB"/>
           </a:p>
@@ -4482,7 +4478,7 @@
           <a:p>
             <a:fld id="{ABE9DD24-0BE8-48CF-8EBF-E8D6CE3426BD}" type="datetimeFigureOut">
               <a:rPr lang="en-GB" smtClean="0"/>
-              <a:t>22/06/2021</a:t>
+              <a:t>05/07/2021</a:t>
             </a:fld>
             <a:endParaRPr lang="en-GB"/>
           </a:p>
@@ -4577,7 +4573,7 @@
           <a:p>
             <a:fld id="{ABE9DD24-0BE8-48CF-8EBF-E8D6CE3426BD}" type="datetimeFigureOut">
               <a:rPr lang="en-GB" smtClean="0"/>
-              <a:t>22/06/2021</a:t>
+              <a:t>05/07/2021</a:t>
             </a:fld>
             <a:endParaRPr lang="en-GB"/>
           </a:p>
@@ -4832,7 +4828,7 @@
           <a:p>
             <a:fld id="{ABE9DD24-0BE8-48CF-8EBF-E8D6CE3426BD}" type="datetimeFigureOut">
               <a:rPr lang="en-GB" smtClean="0"/>
-              <a:t>22/06/2021</a:t>
+              <a:t>05/07/2021</a:t>
             </a:fld>
             <a:endParaRPr lang="en-GB"/>
           </a:p>
@@ -5132,7 +5128,7 @@
           <a:p>
             <a:fld id="{ABE9DD24-0BE8-48CF-8EBF-E8D6CE3426BD}" type="datetimeFigureOut">
               <a:rPr lang="en-GB" smtClean="0"/>
-              <a:t>22/06/2021</a:t>
+              <a:t>05/07/2021</a:t>
             </a:fld>
             <a:endParaRPr lang="en-GB"/>
           </a:p>
@@ -5366,7 +5362,7 @@
           <a:p>
             <a:fld id="{ABE9DD24-0BE8-48CF-8EBF-E8D6CE3426BD}" type="datetimeFigureOut">
               <a:rPr lang="en-GB" smtClean="0"/>
-              <a:t>22/06/2021</a:t>
+              <a:t>05/07/2021</a:t>
             </a:fld>
             <a:endParaRPr lang="en-GB"/>
           </a:p>
@@ -9767,86 +9763,6 @@
 </p:sld>
 </file>
 
-<file path=ppt/slides/slide19.xml><?xml version="1.0" encoding="utf-8"?>
-<p:sld xmlns:a="http://schemas.openxmlformats.org/drawingml/2006/main" xmlns:r="http://schemas.openxmlformats.org/officeDocument/2006/relationships" xmlns:p="http://schemas.openxmlformats.org/presentationml/2006/main">
-  <p:cSld>
-    <p:spTree>
-      <p:nvGrpSpPr>
-        <p:cNvPr id="1" name=""/>
-        <p:cNvGrpSpPr/>
-        <p:nvPr/>
-      </p:nvGrpSpPr>
-      <p:grpSpPr>
-        <a:xfrm>
-          <a:off x="0" y="0"/>
-          <a:ext cx="0" cy="0"/>
-          <a:chOff x="0" y="0"/>
-          <a:chExt cx="0" cy="0"/>
-        </a:xfrm>
-      </p:grpSpPr>
-      <p:sp>
-        <p:nvSpPr>
-          <p:cNvPr id="2" name="Title 1">
-            <a:extLst>
-              <a:ext uri="{FF2B5EF4-FFF2-40B4-BE49-F238E27FC236}">
-                <a16:creationId xmlns:a16="http://schemas.microsoft.com/office/drawing/2014/main" id="{CAD2C9CD-DEEC-4E9C-9923-8B812AA386C1}"/>
-              </a:ext>
-            </a:extLst>
-          </p:cNvPr>
-          <p:cNvSpPr>
-            <a:spLocks noGrp="1"/>
-          </p:cNvSpPr>
-          <p:nvPr>
-            <p:ph type="title"/>
-          </p:nvPr>
-        </p:nvSpPr>
-        <p:spPr/>
-        <p:txBody>
-          <a:bodyPr/>
-          <a:lstStyle/>
-          <a:p>
-            <a:endParaRPr lang="en-GB"/>
-          </a:p>
-        </p:txBody>
-      </p:sp>
-      <p:sp>
-        <p:nvSpPr>
-          <p:cNvPr id="3" name="Content Placeholder 2">
-            <a:extLst>
-              <a:ext uri="{FF2B5EF4-FFF2-40B4-BE49-F238E27FC236}">
-                <a16:creationId xmlns:a16="http://schemas.microsoft.com/office/drawing/2014/main" id="{0A5DE673-4458-4CF0-8651-5E0D63C8C9F8}"/>
-              </a:ext>
-            </a:extLst>
-          </p:cNvPr>
-          <p:cNvSpPr>
-            <a:spLocks noGrp="1"/>
-          </p:cNvSpPr>
-          <p:nvPr>
-            <p:ph idx="1"/>
-          </p:nvPr>
-        </p:nvSpPr>
-        <p:spPr/>
-        <p:txBody>
-          <a:bodyPr/>
-          <a:lstStyle/>
-          <a:p>
-            <a:endParaRPr lang="en-GB"/>
-          </a:p>
-        </p:txBody>
-      </p:sp>
-    </p:spTree>
-    <p:extLst>
-      <p:ext uri="{BB962C8B-B14F-4D97-AF65-F5344CB8AC3E}">
-        <p14:creationId xmlns:p14="http://schemas.microsoft.com/office/powerpoint/2010/main" val="738600005"/>
-      </p:ext>
-    </p:extLst>
-  </p:cSld>
-  <p:clrMapOvr>
-    <a:masterClrMapping/>
-  </p:clrMapOvr>
-</p:sld>
-</file>
-
 <file path=ppt/slides/slide2.xml><?xml version="1.0" encoding="utf-8"?>
 <p:sld xmlns:a="http://schemas.openxmlformats.org/drawingml/2006/main" xmlns:r="http://schemas.openxmlformats.org/officeDocument/2006/relationships" xmlns:p="http://schemas.openxmlformats.org/presentationml/2006/main">
   <p:cSld>
@@ -9973,474 +9889,6 @@
     <p:extLst>
       <p:ext uri="{BB962C8B-B14F-4D97-AF65-F5344CB8AC3E}">
         <p14:creationId xmlns:p14="http://schemas.microsoft.com/office/powerpoint/2010/main" val="1322735033"/>
-      </p:ext>
-    </p:extLst>
-  </p:cSld>
-  <p:clrMapOvr>
-    <a:masterClrMapping/>
-  </p:clrMapOvr>
-</p:sld>
-</file>
-
-<file path=ppt/slides/slide20.xml><?xml version="1.0" encoding="utf-8"?>
-<p:sld xmlns:a="http://schemas.openxmlformats.org/drawingml/2006/main" xmlns:r="http://schemas.openxmlformats.org/officeDocument/2006/relationships" xmlns:p="http://schemas.openxmlformats.org/presentationml/2006/main">
-  <p:cSld>
-    <p:spTree>
-      <p:nvGrpSpPr>
-        <p:cNvPr id="1" name=""/>
-        <p:cNvGrpSpPr/>
-        <p:nvPr/>
-      </p:nvGrpSpPr>
-      <p:grpSpPr>
-        <a:xfrm>
-          <a:off x="0" y="0"/>
-          <a:ext cx="0" cy="0"/>
-          <a:chOff x="0" y="0"/>
-          <a:chExt cx="0" cy="0"/>
-        </a:xfrm>
-      </p:grpSpPr>
-      <p:sp>
-        <p:nvSpPr>
-          <p:cNvPr id="2" name="Title 1">
-            <a:extLst>
-              <a:ext uri="{FF2B5EF4-FFF2-40B4-BE49-F238E27FC236}">
-                <a16:creationId xmlns:a16="http://schemas.microsoft.com/office/drawing/2014/main" id="{10EDB5F8-AD2F-4884-AE07-AC6235D28851}"/>
-              </a:ext>
-            </a:extLst>
-          </p:cNvPr>
-          <p:cNvSpPr>
-            <a:spLocks noGrp="1"/>
-          </p:cNvSpPr>
-          <p:nvPr>
-            <p:ph type="title"/>
-          </p:nvPr>
-        </p:nvSpPr>
-        <p:spPr/>
-        <p:txBody>
-          <a:bodyPr/>
-          <a:lstStyle/>
-          <a:p>
-            <a:r>
-              <a:rPr lang="en-CH" dirty="0"/>
-              <a:t>Outline</a:t>
-            </a:r>
-            <a:endParaRPr lang="en-GB" dirty="0"/>
-          </a:p>
-        </p:txBody>
-      </p:sp>
-      <p:sp>
-        <p:nvSpPr>
-          <p:cNvPr id="3" name="Content Placeholder 2">
-            <a:extLst>
-              <a:ext uri="{FF2B5EF4-FFF2-40B4-BE49-F238E27FC236}">
-                <a16:creationId xmlns:a16="http://schemas.microsoft.com/office/drawing/2014/main" id="{A2771E74-8F69-4498-92A7-93E27879EAC5}"/>
-              </a:ext>
-            </a:extLst>
-          </p:cNvPr>
-          <p:cNvSpPr>
-            <a:spLocks noGrp="1"/>
-          </p:cNvSpPr>
-          <p:nvPr>
-            <p:ph idx="1"/>
-          </p:nvPr>
-        </p:nvSpPr>
-        <p:spPr>
-          <a:xfrm>
-            <a:off x="838200" y="1981200"/>
-            <a:ext cx="10515600" cy="4805680"/>
-          </a:xfrm>
-        </p:spPr>
-        <p:txBody>
-          <a:bodyPr>
-            <a:normAutofit/>
-          </a:bodyPr>
-          <a:lstStyle/>
-          <a:p>
-            <a:r>
-              <a:rPr lang="en-CH" dirty="0"/>
-              <a:t>What is </a:t>
-            </a:r>
-            <a:r>
-              <a:rPr lang="en-CH" dirty="0" err="1"/>
-              <a:t>data.table</a:t>
-            </a:r>
-            <a:r>
-              <a:rPr lang="en-CH" dirty="0"/>
-              <a:t> (extension to </a:t>
-            </a:r>
-            <a:r>
-              <a:rPr lang="en-CH" dirty="0" err="1"/>
-              <a:t>data.frame</a:t>
-            </a:r>
-            <a:r>
-              <a:rPr lang="en-CH" dirty="0"/>
-              <a:t>) Package </a:t>
-            </a:r>
-            <a:r>
-              <a:rPr lang="en-CH" dirty="0" err="1"/>
-              <a:t>cr</a:t>
-            </a:r>
-            <a:r>
-              <a:rPr lang="en-GB" dirty="0" err="1"/>
-              <a:t>ea</a:t>
-            </a:r>
-            <a:r>
-              <a:rPr lang="en-CH" dirty="0"/>
-              <a:t>tor Matt </a:t>
-            </a:r>
-            <a:r>
-              <a:rPr lang="en-CH" dirty="0" err="1"/>
-              <a:t>Dowle</a:t>
-            </a:r>
-            <a:r>
-              <a:rPr lang="en-CH" dirty="0"/>
-              <a:t>. Website link. Already in R for a long time. </a:t>
-            </a:r>
-          </a:p>
-          <a:p>
-            <a:r>
-              <a:rPr lang="en-CH" dirty="0"/>
-              <a:t>Why this presentation: I like </a:t>
-            </a:r>
-            <a:r>
-              <a:rPr lang="en-CH" dirty="0" err="1"/>
-              <a:t>data.table</a:t>
-            </a:r>
-            <a:r>
-              <a:rPr lang="en-CH" dirty="0"/>
-              <a:t> a lot, helped me write better code, not advertised that much. But especially the speed argument may be very relevant for GLEON! </a:t>
-            </a:r>
-          </a:p>
-          <a:p>
-            <a:r>
-              <a:rPr lang="en-CH" dirty="0"/>
-              <a:t>First presentation (15 min.), then walkthrough R script, then questions/exercises</a:t>
-            </a:r>
-          </a:p>
-          <a:p>
-            <a:r>
-              <a:rPr lang="en-CH" dirty="0"/>
-              <a:t>Speed! Internal optimisation, update by reference. R still has the reputation of being a slow language, but actually...</a:t>
-            </a:r>
-          </a:p>
-          <a:p>
-            <a:r>
-              <a:rPr lang="en-CH" dirty="0"/>
-              <a:t>Show benchmark website (faster than base R, Python, </a:t>
-            </a:r>
-            <a:r>
-              <a:rPr lang="en-CH" dirty="0" err="1"/>
-              <a:t>tidyverse</a:t>
-            </a:r>
-            <a:r>
-              <a:rPr lang="en-CH" dirty="0"/>
-              <a:t>...) Now the speed argument is important, but realise that you need to have data &gt;100MB to actually notice anything, or many repeated operations. </a:t>
-            </a:r>
-          </a:p>
-          <a:p>
-            <a:r>
-              <a:rPr lang="en-CH" dirty="0"/>
-              <a:t>Syntax (come for speed, stay for syntax) (quick comparison with </a:t>
-            </a:r>
-            <a:r>
-              <a:rPr lang="en-CH" dirty="0" err="1"/>
-              <a:t>tidyverse</a:t>
-            </a:r>
-            <a:r>
-              <a:rPr lang="en-CH" dirty="0"/>
-              <a:t>; </a:t>
-            </a:r>
-            <a:r>
-              <a:rPr lang="en-CH" dirty="0" err="1"/>
-              <a:t>conci</a:t>
-            </a:r>
-            <a:r>
-              <a:rPr lang="en-GB" dirty="0"/>
-              <a:t>s</a:t>
-            </a:r>
-            <a:r>
-              <a:rPr lang="en-CH" dirty="0"/>
-              <a:t>e and consistent vs. </a:t>
-            </a:r>
-            <a:r>
-              <a:rPr lang="en-GB" dirty="0"/>
-              <a:t>V</a:t>
-            </a:r>
-            <a:r>
-              <a:rPr lang="en-CH" dirty="0" err="1"/>
-              <a:t>erbose</a:t>
-            </a:r>
-            <a:r>
-              <a:rPr lang="en-CH" dirty="0"/>
-              <a:t> and accessible to non-coders) -&gt; Comes down to preference</a:t>
-            </a:r>
-          </a:p>
-          <a:p>
-            <a:endParaRPr lang="en-GB" dirty="0"/>
-          </a:p>
-        </p:txBody>
-      </p:sp>
-    </p:spTree>
-    <p:extLst>
-      <p:ext uri="{BB962C8B-B14F-4D97-AF65-F5344CB8AC3E}">
-        <p14:creationId xmlns:p14="http://schemas.microsoft.com/office/powerpoint/2010/main" val="3539570347"/>
-      </p:ext>
-    </p:extLst>
-  </p:cSld>
-  <p:clrMapOvr>
-    <a:masterClrMapping/>
-  </p:clrMapOvr>
-</p:sld>
-</file>
-
-<file path=ppt/slides/slide21.xml><?xml version="1.0" encoding="utf-8"?>
-<p:sld xmlns:a="http://schemas.openxmlformats.org/drawingml/2006/main" xmlns:r="http://schemas.openxmlformats.org/officeDocument/2006/relationships" xmlns:p="http://schemas.openxmlformats.org/presentationml/2006/main">
-  <p:cSld>
-    <p:spTree>
-      <p:nvGrpSpPr>
-        <p:cNvPr id="1" name=""/>
-        <p:cNvGrpSpPr/>
-        <p:nvPr/>
-      </p:nvGrpSpPr>
-      <p:grpSpPr>
-        <a:xfrm>
-          <a:off x="0" y="0"/>
-          <a:ext cx="0" cy="0"/>
-          <a:chOff x="0" y="0"/>
-          <a:chExt cx="0" cy="0"/>
-        </a:xfrm>
-      </p:grpSpPr>
-      <p:sp>
-        <p:nvSpPr>
-          <p:cNvPr id="2" name="Title 1">
-            <a:extLst>
-              <a:ext uri="{FF2B5EF4-FFF2-40B4-BE49-F238E27FC236}">
-                <a16:creationId xmlns:a16="http://schemas.microsoft.com/office/drawing/2014/main" id="{8E936160-CDA4-4D95-8BA2-E18B9119E4D4}"/>
-              </a:ext>
-            </a:extLst>
-          </p:cNvPr>
-          <p:cNvSpPr>
-            <a:spLocks noGrp="1"/>
-          </p:cNvSpPr>
-          <p:nvPr>
-            <p:ph type="title"/>
-          </p:nvPr>
-        </p:nvSpPr>
-        <p:spPr/>
-        <p:txBody>
-          <a:bodyPr/>
-          <a:lstStyle/>
-          <a:p>
-            <a:r>
-              <a:rPr lang="en-CH" dirty="0"/>
-              <a:t>Outline</a:t>
-            </a:r>
-            <a:endParaRPr lang="en-GB" dirty="0"/>
-          </a:p>
-        </p:txBody>
-      </p:sp>
-      <p:sp>
-        <p:nvSpPr>
-          <p:cNvPr id="3" name="Content Placeholder 2">
-            <a:extLst>
-              <a:ext uri="{FF2B5EF4-FFF2-40B4-BE49-F238E27FC236}">
-                <a16:creationId xmlns:a16="http://schemas.microsoft.com/office/drawing/2014/main" id="{C196087E-8490-433C-A21C-0993DDE57A09}"/>
-              </a:ext>
-            </a:extLst>
-          </p:cNvPr>
-          <p:cNvSpPr>
-            <a:spLocks noGrp="1"/>
-          </p:cNvSpPr>
-          <p:nvPr>
-            <p:ph idx="1"/>
-          </p:nvPr>
-        </p:nvSpPr>
-        <p:spPr>
-          <a:xfrm>
-            <a:off x="838200" y="1825625"/>
-            <a:ext cx="10515600" cy="4813300"/>
-          </a:xfrm>
-        </p:spPr>
-        <p:txBody>
-          <a:bodyPr>
-            <a:normAutofit/>
-          </a:bodyPr>
-          <a:lstStyle/>
-          <a:p>
-            <a:r>
-              <a:rPr lang="en-CH" dirty="0"/>
-              <a:t>Syntax is consistent, as it is always </a:t>
-            </a:r>
-            <a:r>
-              <a:rPr lang="en-CH" dirty="0" err="1"/>
-              <a:t>i</a:t>
-            </a:r>
-            <a:r>
-              <a:rPr lang="en-CH" dirty="0"/>
-              <a:t>, j, by (some additional arguments possible)</a:t>
-            </a:r>
-          </a:p>
-          <a:p>
-            <a:r>
-              <a:rPr lang="en-CH" dirty="0"/>
-              <a:t>Some like it, some prefer base R or </a:t>
-            </a:r>
-            <a:r>
-              <a:rPr lang="en-CH" dirty="0" err="1"/>
-              <a:t>tidyverse</a:t>
-            </a:r>
-            <a:r>
-              <a:rPr lang="en-CH" dirty="0"/>
-              <a:t>, and in that case, the syntax is a burden when you would like to use the fast computation of </a:t>
-            </a:r>
-            <a:r>
-              <a:rPr lang="en-CH" dirty="0" err="1"/>
-              <a:t>data.table</a:t>
-            </a:r>
-            <a:r>
-              <a:rPr lang="en-CH" dirty="0"/>
-              <a:t>. I hope that my walkthrough would in that case help (also consider </a:t>
-            </a:r>
-            <a:r>
-              <a:rPr lang="en-CH" dirty="0" err="1"/>
-              <a:t>dtplyr</a:t>
-            </a:r>
-            <a:r>
-              <a:rPr lang="en-CH" dirty="0"/>
-              <a:t> if you like the </a:t>
-            </a:r>
-            <a:r>
-              <a:rPr lang="en-CH" dirty="0" err="1"/>
-              <a:t>tidyverse</a:t>
-            </a:r>
-            <a:r>
-              <a:rPr lang="en-CH" dirty="0"/>
-              <a:t> syntax; not as fast as </a:t>
-            </a:r>
-            <a:r>
-              <a:rPr lang="en-CH" dirty="0" err="1"/>
-              <a:t>data.table</a:t>
-            </a:r>
-            <a:r>
-              <a:rPr lang="en-CH" dirty="0"/>
-              <a:t>, but it comes a long way)</a:t>
-            </a:r>
-          </a:p>
-          <a:p>
-            <a:r>
-              <a:rPr lang="en-CH" dirty="0"/>
-              <a:t>Additional upsides: stable, rigorous testing, large community, updates</a:t>
-            </a:r>
-          </a:p>
-          <a:p>
-            <a:r>
-              <a:rPr lang="en-CH" dirty="0"/>
-              <a:t>I like it a lot, but this is not a sales pitch; essentially, if you need the speed, check it out. If you like the syntax, also check it out. </a:t>
-            </a:r>
-          </a:p>
-          <a:p>
-            <a:r>
-              <a:rPr lang="en-CH" dirty="0"/>
-              <a:t>I hope that my walkthrough script can simultaneously act as a “cheat sheet” when using </a:t>
-            </a:r>
-            <a:r>
-              <a:rPr lang="en-CH" dirty="0" err="1"/>
-              <a:t>data.table</a:t>
-            </a:r>
-            <a:r>
-              <a:rPr lang="en-CH" dirty="0"/>
-              <a:t> for the first time. </a:t>
-            </a:r>
-          </a:p>
-        </p:txBody>
-      </p:sp>
-    </p:spTree>
-    <p:extLst>
-      <p:ext uri="{BB962C8B-B14F-4D97-AF65-F5344CB8AC3E}">
-        <p14:creationId xmlns:p14="http://schemas.microsoft.com/office/powerpoint/2010/main" val="3322812324"/>
-      </p:ext>
-    </p:extLst>
-  </p:cSld>
-  <p:clrMapOvr>
-    <a:masterClrMapping/>
-  </p:clrMapOvr>
-</p:sld>
-</file>
-
-<file path=ppt/slides/slide22.xml><?xml version="1.0" encoding="utf-8"?>
-<p:sld xmlns:a="http://schemas.openxmlformats.org/drawingml/2006/main" xmlns:r="http://schemas.openxmlformats.org/officeDocument/2006/relationships" xmlns:p="http://schemas.openxmlformats.org/presentationml/2006/main">
-  <p:cSld>
-    <p:spTree>
-      <p:nvGrpSpPr>
-        <p:cNvPr id="1" name=""/>
-        <p:cNvGrpSpPr/>
-        <p:nvPr/>
-      </p:nvGrpSpPr>
-      <p:grpSpPr>
-        <a:xfrm>
-          <a:off x="0" y="0"/>
-          <a:ext cx="0" cy="0"/>
-          <a:chOff x="0" y="0"/>
-          <a:chExt cx="0" cy="0"/>
-        </a:xfrm>
-      </p:grpSpPr>
-      <p:sp>
-        <p:nvSpPr>
-          <p:cNvPr id="2" name="Title 1">
-            <a:extLst>
-              <a:ext uri="{FF2B5EF4-FFF2-40B4-BE49-F238E27FC236}">
-                <a16:creationId xmlns:a16="http://schemas.microsoft.com/office/drawing/2014/main" id="{53E3B787-139B-4504-9B0D-A6449E1690DA}"/>
-              </a:ext>
-            </a:extLst>
-          </p:cNvPr>
-          <p:cNvSpPr>
-            <a:spLocks noGrp="1"/>
-          </p:cNvSpPr>
-          <p:nvPr>
-            <p:ph type="title"/>
-          </p:nvPr>
-        </p:nvSpPr>
-        <p:spPr/>
-        <p:txBody>
-          <a:bodyPr/>
-          <a:lstStyle/>
-          <a:p>
-            <a:endParaRPr lang="en-GB"/>
-          </a:p>
-        </p:txBody>
-      </p:sp>
-      <p:sp>
-        <p:nvSpPr>
-          <p:cNvPr id="3" name="Content Placeholder 2">
-            <a:extLst>
-              <a:ext uri="{FF2B5EF4-FFF2-40B4-BE49-F238E27FC236}">
-                <a16:creationId xmlns:a16="http://schemas.microsoft.com/office/drawing/2014/main" id="{BEF7EA47-70DD-4845-A093-8DA98A0BA08B}"/>
-              </a:ext>
-            </a:extLst>
-          </p:cNvPr>
-          <p:cNvSpPr>
-            <a:spLocks noGrp="1"/>
-          </p:cNvSpPr>
-          <p:nvPr>
-            <p:ph idx="1"/>
-          </p:nvPr>
-        </p:nvSpPr>
-        <p:spPr/>
-        <p:txBody>
-          <a:bodyPr/>
-          <a:lstStyle/>
-          <a:p>
-            <a:r>
-              <a:rPr lang="en-CH" dirty="0"/>
-              <a:t>Speed is good, but you should focus on the bottlenecks</a:t>
-            </a:r>
-          </a:p>
-        </p:txBody>
-      </p:sp>
-    </p:spTree>
-    <p:extLst>
-      <p:ext uri="{BB962C8B-B14F-4D97-AF65-F5344CB8AC3E}">
-        <p14:creationId xmlns:p14="http://schemas.microsoft.com/office/powerpoint/2010/main" val="633947544"/>
       </p:ext>
     </p:extLst>
   </p:cSld>

</xml_diff>